<commit_message>
added AI report in presentation, fixed some spelling issues
</commit_message>
<xml_diff>
--- a/Testare_Unitara_Java.pptx
+++ b/Testare_Unitara_Java.pptx
@@ -15,9 +15,10 @@
     <p:sldId id="262" r:id="rId9"/>
     <p:sldId id="263" r:id="rId10"/>
     <p:sldId id="264" r:id="rId11"/>
-    <p:sldId id="265" r:id="rId12"/>
-    <p:sldId id="266" r:id="rId13"/>
-    <p:sldId id="267" r:id="rId14"/>
+    <p:sldId id="269" r:id="rId12"/>
+    <p:sldId id="265" r:id="rId13"/>
+    <p:sldId id="266" r:id="rId14"/>
+    <p:sldId id="267" r:id="rId15"/>
   </p:sldIdLst>
   <p:sldSz cx="12192000" cy="6858000"/>
   <p:notesSz cx="6858000" cy="9144000"/>
@@ -6249,10 +6250,18 @@
           <a:lstStyle/>
           <a:p>
             <a:r>
-              <a:rPr lang="en-US"/>
-              <a:t>Generarea testelor</a:t>
-            </a:r>
-            <a:endParaRPr lang="LID4096"/>
+              <a:rPr lang="en-US" dirty="0" err="1"/>
+              <a:t>Generarea</a:t>
+            </a:r>
+            <a:r>
+              <a:rPr lang="en-US" dirty="0"/>
+              <a:t> </a:t>
+            </a:r>
+            <a:r>
+              <a:rPr lang="en-US" dirty="0" err="1"/>
+              <a:t>testelor</a:t>
+            </a:r>
+            <a:endParaRPr lang="LID4096" dirty="0"/>
           </a:p>
         </p:txBody>
       </p:sp>
@@ -6282,22 +6291,290 @@
           <a:bodyPr/>
           <a:lstStyle/>
           <a:p>
-            <a:r>
-              <a:rPr lang="en-US"/>
-              <a:t>In total au fost generate 42 de teste pentru acoperirea fiecarui caz posibil, insa nu au fost scrise de mana</a:t>
-            </a:r>
-          </a:p>
-          <a:p>
-            <a:r>
-              <a:rPr lang="en-US"/>
-              <a:t>Am facut un script scurt in python care a generat prin backtracking liniile de cod, dat fiind ca testele au aceeasi structura, singurele diferente fiind valorile parametrilor</a:t>
-            </a:r>
-          </a:p>
-          <a:p>
             <a:pPr marL="0" indent="0">
               <a:buNone/>
             </a:pPr>
-            <a:endParaRPr lang="LID4096"/>
+            <a:r>
+              <a:rPr lang="en-US" dirty="0" err="1"/>
+              <a:t>Generare</a:t>
+            </a:r>
+            <a:r>
+              <a:rPr lang="en-US" dirty="0"/>
+              <a:t> cu AI (ChatGPT 3.5):</a:t>
+            </a:r>
+          </a:p>
+          <a:p>
+            <a:r>
+              <a:rPr lang="en-US" dirty="0"/>
+              <a:t>Am </a:t>
+            </a:r>
+            <a:r>
+              <a:rPr lang="en-US" dirty="0" err="1"/>
+              <a:t>incercat</a:t>
+            </a:r>
+            <a:r>
+              <a:rPr lang="en-US" dirty="0"/>
+              <a:t> </a:t>
+            </a:r>
+            <a:r>
+              <a:rPr lang="en-US" dirty="0" err="1"/>
+              <a:t>sa</a:t>
+            </a:r>
+            <a:r>
+              <a:rPr lang="en-US" dirty="0"/>
+              <a:t> </a:t>
+            </a:r>
+            <a:r>
+              <a:rPr lang="en-US" dirty="0" err="1"/>
+              <a:t>generam</a:t>
+            </a:r>
+            <a:r>
+              <a:rPr lang="en-US" dirty="0"/>
+              <a:t> automat </a:t>
+            </a:r>
+            <a:r>
+              <a:rPr lang="en-US" dirty="0" err="1"/>
+              <a:t>testele</a:t>
+            </a:r>
+            <a:r>
+              <a:rPr lang="en-US" dirty="0"/>
+              <a:t> cu un tool AI</a:t>
+            </a:r>
+          </a:p>
+          <a:p>
+            <a:r>
+              <a:rPr lang="en-US" dirty="0" err="1"/>
+              <a:t>Testele</a:t>
+            </a:r>
+            <a:r>
+              <a:rPr lang="en-US" dirty="0"/>
+              <a:t> generate </a:t>
+            </a:r>
+            <a:r>
+              <a:rPr lang="en-US" dirty="0" err="1"/>
+              <a:t>acopereau</a:t>
+            </a:r>
+            <a:r>
+              <a:rPr lang="en-US" dirty="0"/>
+              <a:t> </a:t>
+            </a:r>
+            <a:r>
+              <a:rPr lang="en-US" dirty="0" err="1"/>
+              <a:t>corespunzator</a:t>
+            </a:r>
+            <a:r>
+              <a:rPr lang="en-US" dirty="0"/>
+              <a:t> </a:t>
+            </a:r>
+            <a:r>
+              <a:rPr lang="en-US" dirty="0" err="1"/>
+              <a:t>toate</a:t>
+            </a:r>
+            <a:r>
+              <a:rPr lang="en-US" dirty="0"/>
+              <a:t> </a:t>
+            </a:r>
+            <a:r>
+              <a:rPr lang="en-US" dirty="0" err="1"/>
+              <a:t>clasele</a:t>
+            </a:r>
+            <a:r>
+              <a:rPr lang="en-US" dirty="0"/>
+              <a:t> de </a:t>
+            </a:r>
+            <a:r>
+              <a:rPr lang="en-US" dirty="0" err="1"/>
+              <a:t>echivalenta</a:t>
+            </a:r>
+            <a:endParaRPr lang="en-US" dirty="0"/>
+          </a:p>
+          <a:p>
+            <a:r>
+              <a:rPr lang="en-US" dirty="0" err="1"/>
+              <a:t>Valorile</a:t>
+            </a:r>
+            <a:r>
+              <a:rPr lang="en-US" dirty="0"/>
+              <a:t> din </a:t>
+            </a:r>
+            <a:r>
+              <a:rPr lang="en-US" dirty="0" err="1"/>
+              <a:t>asserturi</a:t>
+            </a:r>
+            <a:r>
+              <a:rPr lang="en-US" dirty="0"/>
+              <a:t> </a:t>
+            </a:r>
+            <a:r>
+              <a:rPr lang="en-US" dirty="0" err="1"/>
+              <a:t>erau</a:t>
+            </a:r>
+            <a:r>
+              <a:rPr lang="en-US" dirty="0"/>
+              <a:t> </a:t>
+            </a:r>
+            <a:r>
+              <a:rPr lang="en-US" dirty="0" err="1"/>
+              <a:t>gresite</a:t>
+            </a:r>
+            <a:r>
+              <a:rPr lang="en-US" dirty="0"/>
+              <a:t>, </a:t>
+            </a:r>
+            <a:r>
+              <a:rPr lang="en-US" dirty="0" err="1"/>
+              <a:t>dat</a:t>
+            </a:r>
+            <a:r>
+              <a:rPr lang="en-US" dirty="0"/>
+              <a:t> </a:t>
+            </a:r>
+            <a:r>
+              <a:rPr lang="en-US" dirty="0" err="1"/>
+              <a:t>fiind</a:t>
+            </a:r>
+            <a:r>
+              <a:rPr lang="en-US" dirty="0"/>
+              <a:t> ca </a:t>
+            </a:r>
+            <a:r>
+              <a:rPr lang="en-US" dirty="0" err="1"/>
+              <a:t>programul</a:t>
+            </a:r>
+            <a:r>
+              <a:rPr lang="en-US" dirty="0"/>
+              <a:t> nostrum </a:t>
+            </a:r>
+            <a:r>
+              <a:rPr lang="en-US" dirty="0" err="1"/>
+              <a:t>executa</a:t>
+            </a:r>
+            <a:r>
+              <a:rPr lang="en-US" dirty="0"/>
+              <a:t> o </a:t>
+            </a:r>
+            <a:r>
+              <a:rPr lang="en-US" dirty="0" err="1"/>
+              <a:t>serie</a:t>
+            </a:r>
+            <a:r>
+              <a:rPr lang="en-US" dirty="0"/>
+              <a:t> de </a:t>
+            </a:r>
+            <a:r>
+              <a:rPr lang="en-US" dirty="0" err="1"/>
+              <a:t>calcule</a:t>
+            </a:r>
+            <a:r>
+              <a:rPr lang="en-US" dirty="0"/>
+              <a:t> </a:t>
+            </a:r>
+            <a:r>
+              <a:rPr lang="en-US" dirty="0" err="1"/>
+              <a:t>nontriviale</a:t>
+            </a:r>
+            <a:r>
+              <a:rPr lang="en-US" dirty="0"/>
+              <a:t>, </a:t>
+            </a:r>
+            <a:r>
+              <a:rPr lang="en-US" dirty="0" err="1"/>
+              <a:t>prea</a:t>
+            </a:r>
+            <a:r>
+              <a:rPr lang="en-US" dirty="0"/>
+              <a:t> complicate </a:t>
+            </a:r>
+            <a:r>
+              <a:rPr lang="en-US" dirty="0" err="1"/>
+              <a:t>pentru</a:t>
+            </a:r>
+            <a:r>
+              <a:rPr lang="en-US" dirty="0"/>
+              <a:t> un LLM</a:t>
+            </a:r>
+          </a:p>
+          <a:p>
+            <a:r>
+              <a:rPr lang="en-US" dirty="0" err="1"/>
+              <a:t>Testele</a:t>
+            </a:r>
+            <a:r>
+              <a:rPr lang="en-US" dirty="0"/>
+              <a:t> ne-au </a:t>
+            </a:r>
+            <a:r>
+              <a:rPr lang="en-US" dirty="0" err="1"/>
+              <a:t>fost</a:t>
+            </a:r>
+            <a:r>
+              <a:rPr lang="en-US" dirty="0"/>
+              <a:t> utile ca </a:t>
+            </a:r>
+            <a:r>
+              <a:rPr lang="en-US" dirty="0" err="1"/>
+              <a:t>punct</a:t>
+            </a:r>
+            <a:r>
+              <a:rPr lang="en-US" dirty="0"/>
+              <a:t> de </a:t>
+            </a:r>
+            <a:r>
+              <a:rPr lang="en-US" dirty="0" err="1"/>
+              <a:t>plecare</a:t>
+            </a:r>
+            <a:endParaRPr lang="en-US" dirty="0"/>
+          </a:p>
+          <a:p>
+            <a:r>
+              <a:rPr lang="en-US" dirty="0"/>
+              <a:t>In rest, ChatGPT a </a:t>
+            </a:r>
+            <a:r>
+              <a:rPr lang="en-US" dirty="0" err="1"/>
+              <a:t>fost</a:t>
+            </a:r>
+            <a:r>
+              <a:rPr lang="en-US" dirty="0"/>
+              <a:t> util </a:t>
+            </a:r>
+            <a:r>
+              <a:rPr lang="en-US" dirty="0" err="1"/>
+              <a:t>pentru</a:t>
+            </a:r>
+            <a:r>
+              <a:rPr lang="en-US" dirty="0"/>
+              <a:t> </a:t>
+            </a:r>
+            <a:r>
+              <a:rPr lang="en-US" dirty="0" err="1"/>
+              <a:t>clarificare</a:t>
+            </a:r>
+            <a:r>
+              <a:rPr lang="en-US" dirty="0"/>
+              <a:t> de concept </a:t>
+            </a:r>
+            <a:r>
+              <a:rPr lang="en-US" dirty="0" err="1"/>
+              <a:t>si</a:t>
+            </a:r>
+            <a:r>
+              <a:rPr lang="en-US" dirty="0"/>
+              <a:t> </a:t>
+            </a:r>
+            <a:r>
+              <a:rPr lang="en-US" dirty="0" err="1"/>
+              <a:t>rezolvare</a:t>
+            </a:r>
+            <a:r>
+              <a:rPr lang="en-US" dirty="0"/>
+              <a:t> de </a:t>
+            </a:r>
+            <a:r>
+              <a:rPr lang="en-US" dirty="0" err="1"/>
+              <a:t>erori</a:t>
+            </a:r>
+            <a:endParaRPr lang="LID4096" dirty="0"/>
           </a:p>
         </p:txBody>
       </p:sp>
@@ -6336,6 +6613,460 @@
           <p:cNvPr id="2" name="Title 1">
             <a:extLst>
               <a:ext uri="{FF2B5EF4-FFF2-40B4-BE49-F238E27FC236}">
+                <a16:creationId xmlns:a16="http://schemas.microsoft.com/office/drawing/2014/main" id="{038CB330-301D-2FC5-1B1F-CAD5696A6C12}"/>
+              </a:ext>
+            </a:extLst>
+          </p:cNvPr>
+          <p:cNvSpPr>
+            <a:spLocks noGrp="1"/>
+          </p:cNvSpPr>
+          <p:nvPr>
+            <p:ph type="title"/>
+          </p:nvPr>
+        </p:nvSpPr>
+        <p:spPr/>
+        <p:txBody>
+          <a:bodyPr/>
+          <a:lstStyle/>
+          <a:p>
+            <a:r>
+              <a:rPr lang="en-US" dirty="0" err="1"/>
+              <a:t>Generarea</a:t>
+            </a:r>
+            <a:r>
+              <a:rPr lang="en-US" dirty="0"/>
+              <a:t> </a:t>
+            </a:r>
+            <a:r>
+              <a:rPr lang="en-US" dirty="0" err="1"/>
+              <a:t>testelor</a:t>
+            </a:r>
+            <a:endParaRPr lang="LID4096" dirty="0"/>
+          </a:p>
+        </p:txBody>
+      </p:sp>
+      <p:sp>
+        <p:nvSpPr>
+          <p:cNvPr id="3" name="Content Placeholder 2">
+            <a:extLst>
+              <a:ext uri="{FF2B5EF4-FFF2-40B4-BE49-F238E27FC236}">
+                <a16:creationId xmlns:a16="http://schemas.microsoft.com/office/drawing/2014/main" id="{C71331FF-76AC-CAFA-FFA7-4231DA9EA8FE}"/>
+              </a:ext>
+            </a:extLst>
+          </p:cNvPr>
+          <p:cNvSpPr>
+            <a:spLocks noGrp="1"/>
+          </p:cNvSpPr>
+          <p:nvPr>
+            <p:ph idx="1"/>
+          </p:nvPr>
+        </p:nvSpPr>
+        <p:spPr>
+          <a:xfrm>
+            <a:off x="537470" y="1552077"/>
+            <a:ext cx="9404722" cy="4768734"/>
+          </a:xfrm>
+        </p:spPr>
+        <p:txBody>
+          <a:bodyPr/>
+          <a:lstStyle/>
+          <a:p>
+            <a:pPr marL="0" indent="0">
+              <a:buNone/>
+            </a:pPr>
+            <a:r>
+              <a:rPr lang="en-US" dirty="0" err="1"/>
+              <a:t>Generare</a:t>
+            </a:r>
+            <a:r>
+              <a:rPr lang="en-US" dirty="0"/>
+              <a:t> cu un script custom:</a:t>
+            </a:r>
+          </a:p>
+          <a:p>
+            <a:r>
+              <a:rPr lang="en-US" dirty="0" err="1"/>
+              <a:t>Fiind</a:t>
+            </a:r>
+            <a:r>
+              <a:rPr lang="en-US" dirty="0"/>
+              <a:t> </a:t>
+            </a:r>
+            <a:r>
+              <a:rPr lang="en-US" dirty="0" err="1"/>
+              <a:t>vorba</a:t>
+            </a:r>
+            <a:r>
+              <a:rPr lang="en-US" dirty="0"/>
+              <a:t> de un calculator, </a:t>
+            </a:r>
+            <a:r>
+              <a:rPr lang="en-US" dirty="0" err="1"/>
+              <a:t>testele</a:t>
+            </a:r>
+            <a:r>
+              <a:rPr lang="en-US" dirty="0"/>
+              <a:t> au </a:t>
+            </a:r>
+            <a:r>
+              <a:rPr lang="en-US" dirty="0" err="1"/>
+              <a:t>aceeasi</a:t>
+            </a:r>
+            <a:r>
+              <a:rPr lang="en-US" dirty="0"/>
+              <a:t> </a:t>
+            </a:r>
+            <a:r>
+              <a:rPr lang="en-US" dirty="0" err="1"/>
+              <a:t>structura</a:t>
+            </a:r>
+            <a:r>
+              <a:rPr lang="en-US" dirty="0"/>
+              <a:t>, </a:t>
+            </a:r>
+            <a:r>
+              <a:rPr lang="en-US" dirty="0" err="1"/>
+              <a:t>singurele</a:t>
+            </a:r>
+            <a:r>
+              <a:rPr lang="en-US" dirty="0"/>
+              <a:t> </a:t>
+            </a:r>
+            <a:r>
+              <a:rPr lang="en-US" dirty="0" err="1"/>
+              <a:t>diferente</a:t>
+            </a:r>
+            <a:r>
+              <a:rPr lang="en-US" dirty="0"/>
+              <a:t> </a:t>
+            </a:r>
+            <a:r>
+              <a:rPr lang="en-US" dirty="0" err="1"/>
+              <a:t>fiind</a:t>
+            </a:r>
+            <a:r>
+              <a:rPr lang="en-US" dirty="0"/>
+              <a:t> </a:t>
+            </a:r>
+            <a:r>
+              <a:rPr lang="en-US" dirty="0" err="1"/>
+              <a:t>valorile</a:t>
+            </a:r>
+            <a:r>
+              <a:rPr lang="en-US" dirty="0"/>
+              <a:t> </a:t>
+            </a:r>
+            <a:r>
+              <a:rPr lang="en-US" dirty="0" err="1"/>
+              <a:t>parametrilor</a:t>
+            </a:r>
+            <a:r>
+              <a:rPr lang="en-US" dirty="0"/>
+              <a:t>, </a:t>
+            </a:r>
+            <a:r>
+              <a:rPr lang="en-US" dirty="0" err="1"/>
+              <a:t>deci</a:t>
+            </a:r>
+            <a:r>
+              <a:rPr lang="en-US" dirty="0"/>
+              <a:t> pot fi generate automat</a:t>
+            </a:r>
+          </a:p>
+          <a:p>
+            <a:r>
+              <a:rPr lang="en-US" dirty="0"/>
+              <a:t>In total au </a:t>
+            </a:r>
+            <a:r>
+              <a:rPr lang="en-US" dirty="0" err="1"/>
+              <a:t>fost</a:t>
+            </a:r>
+            <a:r>
+              <a:rPr lang="en-US" dirty="0"/>
+              <a:t> generate 42 de teste </a:t>
+            </a:r>
+            <a:r>
+              <a:rPr lang="en-US" dirty="0" err="1"/>
+              <a:t>pentru</a:t>
+            </a:r>
+            <a:r>
+              <a:rPr lang="en-US" dirty="0"/>
+              <a:t> </a:t>
+            </a:r>
+            <a:r>
+              <a:rPr lang="en-US" dirty="0" err="1"/>
+              <a:t>acoperirea</a:t>
+            </a:r>
+            <a:r>
+              <a:rPr lang="en-US" dirty="0"/>
+              <a:t> </a:t>
+            </a:r>
+            <a:r>
+              <a:rPr lang="en-US" dirty="0" err="1"/>
+              <a:t>fiecarui</a:t>
+            </a:r>
+            <a:r>
+              <a:rPr lang="en-US" dirty="0"/>
+              <a:t> </a:t>
+            </a:r>
+            <a:r>
+              <a:rPr lang="en-US" dirty="0" err="1"/>
+              <a:t>caz</a:t>
+            </a:r>
+            <a:r>
+              <a:rPr lang="en-US" dirty="0"/>
+              <a:t> </a:t>
+            </a:r>
+            <a:r>
+              <a:rPr lang="en-US" dirty="0" err="1"/>
+              <a:t>posibil</a:t>
+            </a:r>
+            <a:endParaRPr lang="en-US" dirty="0"/>
+          </a:p>
+          <a:p>
+            <a:r>
+              <a:rPr lang="en-US" dirty="0"/>
+              <a:t>Am </a:t>
+            </a:r>
+            <a:r>
+              <a:rPr lang="en-US" dirty="0" err="1"/>
+              <a:t>facut</a:t>
+            </a:r>
+            <a:r>
+              <a:rPr lang="en-US" dirty="0"/>
+              <a:t> un script in python care </a:t>
+            </a:r>
+            <a:r>
+              <a:rPr lang="en-US" dirty="0" err="1"/>
+              <a:t>genereaza</a:t>
+            </a:r>
+            <a:r>
+              <a:rPr lang="en-US" dirty="0"/>
+              <a:t>, </a:t>
+            </a:r>
+            <a:r>
+              <a:rPr lang="en-US" dirty="0" err="1"/>
+              <a:t>prin</a:t>
+            </a:r>
+            <a:r>
+              <a:rPr lang="en-US" dirty="0"/>
+              <a:t> backtracking pe </a:t>
+            </a:r>
+            <a:r>
+              <a:rPr lang="en-US" dirty="0" err="1"/>
+              <a:t>valorile</a:t>
+            </a:r>
+            <a:r>
+              <a:rPr lang="en-US" dirty="0"/>
+              <a:t> </a:t>
+            </a:r>
+            <a:r>
+              <a:rPr lang="en-US" dirty="0" err="1"/>
+              <a:t>claselor</a:t>
+            </a:r>
+            <a:r>
+              <a:rPr lang="en-US" dirty="0"/>
+              <a:t> de </a:t>
+            </a:r>
+            <a:r>
+              <a:rPr lang="en-US" dirty="0" err="1"/>
+              <a:t>echivalenta</a:t>
+            </a:r>
+            <a:r>
+              <a:rPr lang="en-US" dirty="0"/>
+              <a:t>, </a:t>
+            </a:r>
+            <a:r>
+              <a:rPr lang="en-US" dirty="0" err="1"/>
+              <a:t>codul</a:t>
+            </a:r>
+            <a:r>
+              <a:rPr lang="en-US" dirty="0"/>
+              <a:t> </a:t>
+            </a:r>
+            <a:r>
+              <a:rPr lang="en-US" dirty="0" err="1"/>
+              <a:t>aferent</a:t>
+            </a:r>
+            <a:r>
+              <a:rPr lang="en-US" dirty="0"/>
+              <a:t> </a:t>
+            </a:r>
+            <a:r>
+              <a:rPr lang="en-US" dirty="0" err="1"/>
+              <a:t>testelor</a:t>
+            </a:r>
+            <a:endParaRPr lang="en-US" dirty="0"/>
+          </a:p>
+          <a:p>
+            <a:r>
+              <a:rPr lang="en-US" dirty="0"/>
+              <a:t>In </a:t>
+            </a:r>
+            <a:r>
+              <a:rPr lang="en-US" dirty="0" err="1"/>
+              <a:t>cazul</a:t>
+            </a:r>
+            <a:r>
+              <a:rPr lang="en-US" dirty="0"/>
+              <a:t> </a:t>
+            </a:r>
+            <a:r>
+              <a:rPr lang="en-US" dirty="0" err="1"/>
+              <a:t>nostru</a:t>
+            </a:r>
+            <a:r>
+              <a:rPr lang="en-US" dirty="0"/>
+              <a:t>, </a:t>
+            </a:r>
+            <a:r>
+              <a:rPr lang="en-US" dirty="0" err="1"/>
+              <a:t>testele</a:t>
+            </a:r>
+            <a:r>
+              <a:rPr lang="en-US" dirty="0"/>
+              <a:t> generate de </a:t>
+            </a:r>
+            <a:r>
+              <a:rPr lang="en-US" dirty="0" err="1"/>
+              <a:t>noi</a:t>
+            </a:r>
+            <a:r>
+              <a:rPr lang="en-US" dirty="0"/>
+              <a:t> sunt </a:t>
+            </a:r>
+            <a:r>
+              <a:rPr lang="en-US" dirty="0" err="1"/>
+              <a:t>mai</a:t>
+            </a:r>
+            <a:r>
+              <a:rPr lang="en-US" dirty="0"/>
+              <a:t> </a:t>
+            </a:r>
+            <a:r>
+              <a:rPr lang="en-US" dirty="0" err="1"/>
+              <a:t>bune</a:t>
+            </a:r>
+            <a:r>
+              <a:rPr lang="en-US" dirty="0"/>
+              <a:t> </a:t>
+            </a:r>
+            <a:r>
+              <a:rPr lang="en-US" dirty="0" err="1"/>
+              <a:t>decat</a:t>
+            </a:r>
+            <a:r>
+              <a:rPr lang="en-US" dirty="0"/>
+              <a:t> </a:t>
+            </a:r>
+            <a:r>
+              <a:rPr lang="en-US" dirty="0" err="1"/>
+              <a:t>cele</a:t>
+            </a:r>
+            <a:r>
+              <a:rPr lang="en-US" dirty="0"/>
+              <a:t> generate cu AI, </a:t>
+            </a:r>
+            <a:r>
+              <a:rPr lang="en-US" dirty="0" err="1"/>
+              <a:t>setul</a:t>
+            </a:r>
+            <a:r>
+              <a:rPr lang="en-US" dirty="0"/>
+              <a:t> </a:t>
+            </a:r>
+            <a:r>
+              <a:rPr lang="en-US" dirty="0" err="1"/>
+              <a:t>nostru</a:t>
+            </a:r>
+            <a:r>
+              <a:rPr lang="en-US" dirty="0"/>
+              <a:t> de teste </a:t>
+            </a:r>
+            <a:r>
+              <a:rPr lang="en-US" dirty="0" err="1"/>
+              <a:t>fiind</a:t>
+            </a:r>
+            <a:r>
+              <a:rPr lang="en-US" dirty="0"/>
+              <a:t> </a:t>
+            </a:r>
+            <a:r>
+              <a:rPr lang="en-US" dirty="0" err="1"/>
+              <a:t>exhaustiv</a:t>
+            </a:r>
+            <a:r>
+              <a:rPr lang="en-US" dirty="0"/>
+              <a:t> </a:t>
+            </a:r>
+            <a:r>
+              <a:rPr lang="en-US" dirty="0" err="1"/>
+              <a:t>si</a:t>
+            </a:r>
+            <a:r>
+              <a:rPr lang="en-US" dirty="0"/>
+              <a:t> minimal </a:t>
+            </a:r>
+            <a:r>
+              <a:rPr lang="en-US" dirty="0" err="1"/>
+              <a:t>si</a:t>
+            </a:r>
+            <a:r>
+              <a:rPr lang="en-US" dirty="0"/>
+              <a:t>  cu </a:t>
+            </a:r>
+            <a:r>
+              <a:rPr lang="en-US" dirty="0" err="1"/>
+              <a:t>valorile</a:t>
+            </a:r>
+            <a:r>
+              <a:rPr lang="en-US" dirty="0"/>
+              <a:t> </a:t>
+            </a:r>
+            <a:r>
+              <a:rPr lang="en-US" dirty="0" err="1"/>
+              <a:t>corecte</a:t>
+            </a:r>
+            <a:endParaRPr lang="LID4096" dirty="0"/>
+          </a:p>
+        </p:txBody>
+      </p:sp>
+    </p:spTree>
+    <p:extLst>
+      <p:ext uri="{BB962C8B-B14F-4D97-AF65-F5344CB8AC3E}">
+        <p14:creationId xmlns:p14="http://schemas.microsoft.com/office/powerpoint/2010/main" val="1615679146"/>
+      </p:ext>
+    </p:extLst>
+  </p:cSld>
+  <p:clrMapOvr>
+    <a:masterClrMapping/>
+  </p:clrMapOvr>
+</p:sld>
+</file>
+
+<file path=ppt/slides/slide12.xml><?xml version="1.0" encoding="utf-8"?>
+<p:sld xmlns:a="http://schemas.openxmlformats.org/drawingml/2006/main" xmlns:r="http://schemas.openxmlformats.org/officeDocument/2006/relationships" xmlns:p="http://schemas.openxmlformats.org/presentationml/2006/main">
+  <p:cSld>
+    <p:spTree>
+      <p:nvGrpSpPr>
+        <p:cNvPr id="1" name=""/>
+        <p:cNvGrpSpPr/>
+        <p:nvPr/>
+      </p:nvGrpSpPr>
+      <p:grpSpPr>
+        <a:xfrm>
+          <a:off x="0" y="0"/>
+          <a:ext cx="0" cy="0"/>
+          <a:chOff x="0" y="0"/>
+          <a:chExt cx="0" cy="0"/>
+        </a:xfrm>
+      </p:grpSpPr>
+      <p:sp>
+        <p:nvSpPr>
+          <p:cNvPr id="2" name="Title 1">
+            <a:extLst>
+              <a:ext uri="{FF2B5EF4-FFF2-40B4-BE49-F238E27FC236}">
                 <a16:creationId xmlns:a16="http://schemas.microsoft.com/office/drawing/2014/main" id="{0ED5B48E-9750-25B6-4B77-AB1F98123EFF}"/>
               </a:ext>
             </a:extLst>
@@ -6402,7 +7133,7 @@
 </p:sld>
 </file>
 
-<file path=ppt/slides/slide12.xml><?xml version="1.0" encoding="utf-8"?>
+<file path=ppt/slides/slide13.xml><?xml version="1.0" encoding="utf-8"?>
 <p:sld xmlns:a="http://schemas.openxmlformats.org/drawingml/2006/main" xmlns:r="http://schemas.openxmlformats.org/officeDocument/2006/relationships" xmlns:p="http://schemas.openxmlformats.org/presentationml/2006/main">
   <p:cSld>
     <p:spTree>
@@ -6475,20 +7206,225 @@
           <a:lstStyle/>
           <a:p>
             <a:r>
-              <a:rPr lang="en-US"/>
-              <a:t>Dat fiind ca testele pe clase de echivalenta si pe valori de frontiera sunt exhaustive, fiecare posibilitate a fost acoperita</a:t>
-            </a:r>
-          </a:p>
-          <a:p>
-            <a:r>
-              <a:rPr lang="en-US"/>
-              <a:t>Astfel, avem acoperire 100% la nivel de instructiune, decizie, conditie, chiar si 100% path coverage</a:t>
-            </a:r>
-          </a:p>
-          <a:p>
-            <a:r>
-              <a:rPr lang="en-US"/>
-              <a:t>In practica, 100% path coverage nu este mereu posibil, insa a fost posibil, aplicatia fiind mai simpla</a:t>
+              <a:rPr lang="en-US" dirty="0"/>
+              <a:t>Dat </a:t>
+            </a:r>
+            <a:r>
+              <a:rPr lang="en-US" dirty="0" err="1"/>
+              <a:t>fiind</a:t>
+            </a:r>
+            <a:r>
+              <a:rPr lang="en-US" dirty="0"/>
+              <a:t> ca </a:t>
+            </a:r>
+            <a:r>
+              <a:rPr lang="en-US" dirty="0" err="1"/>
+              <a:t>testele</a:t>
+            </a:r>
+            <a:r>
+              <a:rPr lang="en-US" dirty="0"/>
+              <a:t> pe </a:t>
+            </a:r>
+            <a:r>
+              <a:rPr lang="en-US" dirty="0" err="1"/>
+              <a:t>clase</a:t>
+            </a:r>
+            <a:r>
+              <a:rPr lang="en-US" dirty="0"/>
+              <a:t> de </a:t>
+            </a:r>
+            <a:r>
+              <a:rPr lang="en-US" dirty="0" err="1"/>
+              <a:t>echivalenta</a:t>
+            </a:r>
+            <a:r>
+              <a:rPr lang="en-US" dirty="0"/>
+              <a:t> sunt generate </a:t>
+            </a:r>
+            <a:r>
+              <a:rPr lang="en-US" dirty="0" err="1"/>
+              <a:t>exhaustiv</a:t>
+            </a:r>
+            <a:r>
+              <a:rPr lang="en-US" dirty="0"/>
+              <a:t>, </a:t>
+            </a:r>
+            <a:r>
+              <a:rPr lang="en-US" dirty="0" err="1"/>
+              <a:t>fiecare</a:t>
+            </a:r>
+            <a:r>
+              <a:rPr lang="en-US" dirty="0"/>
+              <a:t> </a:t>
+            </a:r>
+            <a:r>
+              <a:rPr lang="en-US" dirty="0" err="1"/>
+              <a:t>posibilitate</a:t>
+            </a:r>
+            <a:r>
+              <a:rPr lang="en-US" dirty="0"/>
+              <a:t> a </a:t>
+            </a:r>
+            <a:r>
+              <a:rPr lang="en-US" dirty="0" err="1"/>
+              <a:t>fost</a:t>
+            </a:r>
+            <a:r>
+              <a:rPr lang="en-US" dirty="0"/>
+              <a:t> </a:t>
+            </a:r>
+            <a:r>
+              <a:rPr lang="en-US" dirty="0" err="1"/>
+              <a:t>acoperita</a:t>
+            </a:r>
+            <a:endParaRPr lang="en-US" dirty="0"/>
+          </a:p>
+          <a:p>
+            <a:r>
+              <a:rPr lang="en-US" dirty="0" err="1"/>
+              <a:t>Astfel</a:t>
+            </a:r>
+            <a:r>
+              <a:rPr lang="en-US" dirty="0"/>
+              <a:t>, </a:t>
+            </a:r>
+            <a:r>
+              <a:rPr lang="en-US" dirty="0" err="1"/>
+              <a:t>avem</a:t>
+            </a:r>
+            <a:r>
+              <a:rPr lang="en-US" dirty="0"/>
+              <a:t> </a:t>
+            </a:r>
+            <a:r>
+              <a:rPr lang="en-US" dirty="0" err="1"/>
+              <a:t>acoperire</a:t>
+            </a:r>
+            <a:r>
+              <a:rPr lang="en-US" dirty="0"/>
+              <a:t> 100% la </a:t>
+            </a:r>
+            <a:r>
+              <a:rPr lang="en-US" dirty="0" err="1"/>
+              <a:t>nivel</a:t>
+            </a:r>
+            <a:r>
+              <a:rPr lang="en-US" dirty="0"/>
+              <a:t> de </a:t>
+            </a:r>
+            <a:r>
+              <a:rPr lang="en-US" dirty="0" err="1"/>
+              <a:t>instructiune</a:t>
+            </a:r>
+            <a:r>
+              <a:rPr lang="en-US" dirty="0"/>
+              <a:t>, </a:t>
+            </a:r>
+            <a:r>
+              <a:rPr lang="en-US" dirty="0" err="1"/>
+              <a:t>decizie</a:t>
+            </a:r>
+            <a:r>
+              <a:rPr lang="en-US" dirty="0"/>
+              <a:t>, </a:t>
+            </a:r>
+            <a:r>
+              <a:rPr lang="en-US" dirty="0" err="1"/>
+              <a:t>conditie</a:t>
+            </a:r>
+            <a:r>
+              <a:rPr lang="en-US" dirty="0"/>
+              <a:t>, </a:t>
+            </a:r>
+            <a:r>
+              <a:rPr lang="en-US" dirty="0" err="1"/>
+              <a:t>dar</a:t>
+            </a:r>
+            <a:r>
+              <a:rPr lang="en-US" dirty="0"/>
+              <a:t> </a:t>
+            </a:r>
+            <a:r>
+              <a:rPr lang="en-US" dirty="0" err="1"/>
+              <a:t>si</a:t>
+            </a:r>
+            <a:r>
+              <a:rPr lang="en-US" dirty="0"/>
+              <a:t> la </a:t>
+            </a:r>
+            <a:r>
+              <a:rPr lang="en-US" dirty="0" err="1"/>
+              <a:t>nivel</a:t>
+            </a:r>
+            <a:r>
+              <a:rPr lang="en-US" dirty="0"/>
+              <a:t> de path.</a:t>
+            </a:r>
+          </a:p>
+          <a:p>
+            <a:r>
+              <a:rPr lang="en-US" dirty="0" err="1"/>
+              <a:t>Deoarece</a:t>
+            </a:r>
+            <a:r>
+              <a:rPr lang="en-US" dirty="0"/>
+              <a:t> </a:t>
+            </a:r>
+            <a:r>
+              <a:rPr lang="en-US" dirty="0" err="1"/>
+              <a:t>numarul</a:t>
+            </a:r>
+            <a:r>
+              <a:rPr lang="en-US" dirty="0"/>
+              <a:t> de teste </a:t>
+            </a:r>
+            <a:r>
+              <a:rPr lang="en-US" dirty="0" err="1"/>
+              <a:t>este</a:t>
+            </a:r>
+            <a:r>
+              <a:rPr lang="en-US" dirty="0"/>
+              <a:t> egal cu </a:t>
+            </a:r>
+            <a:r>
+              <a:rPr lang="en-US" dirty="0" err="1"/>
+              <a:t>numarul</a:t>
+            </a:r>
+            <a:r>
+              <a:rPr lang="en-US" dirty="0"/>
+              <a:t> de path-</a:t>
+            </a:r>
+            <a:r>
+              <a:rPr lang="en-US" dirty="0" err="1"/>
+              <a:t>uri</a:t>
+            </a:r>
+            <a:r>
+              <a:rPr lang="en-US" dirty="0"/>
+              <a:t> (24), </a:t>
+            </a:r>
+            <a:r>
+              <a:rPr lang="en-US" dirty="0" err="1"/>
+              <a:t>rezulta</a:t>
+            </a:r>
+            <a:r>
+              <a:rPr lang="en-US" dirty="0"/>
+              <a:t> ca </a:t>
+            </a:r>
+            <a:r>
+              <a:rPr lang="en-US" dirty="0" err="1"/>
+              <a:t>setul</a:t>
+            </a:r>
+            <a:r>
+              <a:rPr lang="en-US" dirty="0"/>
+              <a:t> de teste </a:t>
+            </a:r>
+            <a:r>
+              <a:rPr lang="en-US" dirty="0" err="1"/>
+              <a:t>este</a:t>
+            </a:r>
+            <a:r>
+              <a:rPr lang="en-US" dirty="0"/>
+              <a:t> minimal.</a:t>
             </a:r>
           </a:p>
         </p:txBody>
@@ -6535,7 +7471,7 @@
 </p:sld>
 </file>
 
-<file path=ppt/slides/slide13.xml><?xml version="1.0" encoding="utf-8"?>
+<file path=ppt/slides/slide14.xml><?xml version="1.0" encoding="utf-8"?>
 <p:sld xmlns:a="http://schemas.openxmlformats.org/drawingml/2006/main" xmlns:r="http://schemas.openxmlformats.org/officeDocument/2006/relationships" xmlns:p="http://schemas.openxmlformats.org/presentationml/2006/main">
   <p:cSld>
     <p:spTree>
@@ -6599,7 +7535,7 @@
         </p:nvSpPr>
         <p:spPr>
           <a:xfrm>
-            <a:off x="645132" y="2011680"/>
+            <a:off x="646112" y="1477526"/>
             <a:ext cx="9404722" cy="4236719"/>
           </a:xfrm>
         </p:spPr>
@@ -6608,32 +7544,12 @@
           <a:lstStyle/>
           <a:p>
             <a:r>
-              <a:rPr lang="en-US" dirty="0" err="1"/>
-              <a:t>Avand</a:t>
-            </a:r>
-            <a:r>
-              <a:rPr lang="en-US" dirty="0"/>
-              <a:t> in </a:t>
-            </a:r>
-            <a:r>
-              <a:rPr lang="en-US" dirty="0" err="1"/>
-              <a:t>vedere</a:t>
-            </a:r>
-            <a:r>
-              <a:rPr lang="en-US" dirty="0"/>
-              <a:t> ca </a:t>
-            </a:r>
-            <a:r>
-              <a:rPr lang="en-US" dirty="0" err="1"/>
-              <a:t>avem</a:t>
-            </a:r>
-            <a:r>
-              <a:rPr lang="en-US" dirty="0"/>
-              <a:t> 100% path coverage, </a:t>
-            </a:r>
-            <a:r>
-              <a:rPr lang="en-US" dirty="0" err="1"/>
-              <a:t>fiecare</a:t>
+              <a:rPr lang="en-US" dirty="0"/>
+              <a:t>Am </a:t>
+            </a:r>
+            <a:r>
+              <a:rPr lang="en-US" dirty="0" err="1"/>
+              <a:t>folosit</a:t>
             </a:r>
             <a:r>
               <a:rPr lang="en-US" dirty="0"/>
@@ -6641,19 +7557,102 @@
             </a:r>
             <a:r>
               <a:rPr lang="en-US" dirty="0" err="1"/>
-              <a:t>valoare</a:t>
-            </a:r>
-            <a:r>
-              <a:rPr lang="en-US" dirty="0"/>
-              <a:t> de </a:t>
-            </a:r>
-            <a:r>
-              <a:rPr lang="en-US" dirty="0" err="1"/>
-              <a:t>frontiera</a:t>
-            </a:r>
-            <a:r>
-              <a:rPr lang="en-US" dirty="0"/>
-              <a:t> a </a:t>
+              <a:t>PITest</a:t>
+            </a:r>
+            <a:r>
+              <a:rPr lang="en-US" dirty="0"/>
+              <a:t> </a:t>
+            </a:r>
+            <a:r>
+              <a:rPr lang="en-US" dirty="0" err="1"/>
+              <a:t>pentru</a:t>
+            </a:r>
+            <a:r>
+              <a:rPr lang="en-US" dirty="0"/>
+              <a:t> a ne </a:t>
+            </a:r>
+            <a:r>
+              <a:rPr lang="en-US" dirty="0" err="1"/>
+              <a:t>verifica</a:t>
+            </a:r>
+            <a:r>
+              <a:rPr lang="en-US" dirty="0"/>
+              <a:t> </a:t>
+            </a:r>
+            <a:r>
+              <a:rPr lang="en-US" dirty="0" err="1"/>
+              <a:t>setul</a:t>
+            </a:r>
+            <a:r>
+              <a:rPr lang="en-US" dirty="0"/>
+              <a:t> de teste </a:t>
+            </a:r>
+            <a:r>
+              <a:rPr lang="en-US" dirty="0" err="1"/>
+              <a:t>prin</a:t>
+            </a:r>
+            <a:r>
+              <a:rPr lang="en-US" dirty="0"/>
+              <a:t> </a:t>
+            </a:r>
+            <a:r>
+              <a:rPr lang="en-US" dirty="0" err="1"/>
+              <a:t>analiza</a:t>
+            </a:r>
+            <a:r>
+              <a:rPr lang="en-US" dirty="0"/>
+              <a:t> cu </a:t>
+            </a:r>
+            <a:r>
+              <a:rPr lang="en-US" dirty="0" err="1"/>
+              <a:t>mutanti</a:t>
+            </a:r>
+            <a:endParaRPr lang="en-US" dirty="0"/>
+          </a:p>
+          <a:p>
+            <a:r>
+              <a:rPr lang="en-US" dirty="0"/>
+              <a:t> Dat </a:t>
+            </a:r>
+            <a:r>
+              <a:rPr lang="en-US" dirty="0" err="1"/>
+              <a:t>fiind</a:t>
+            </a:r>
+            <a:r>
+              <a:rPr lang="en-US" dirty="0"/>
+              <a:t> path coverage-</a:t>
+            </a:r>
+            <a:r>
+              <a:rPr lang="en-US" dirty="0" err="1"/>
+              <a:t>ul</a:t>
+            </a:r>
+            <a:r>
+              <a:rPr lang="en-US" dirty="0"/>
+              <a:t> de 100% al </a:t>
+            </a:r>
+            <a:r>
+              <a:rPr lang="en-US" dirty="0" err="1"/>
+              <a:t>testelor</a:t>
+            </a:r>
+            <a:r>
+              <a:rPr lang="en-US" dirty="0"/>
+              <a:t>, </a:t>
+            </a:r>
+            <a:r>
+              <a:rPr lang="en-US" dirty="0" err="1"/>
+              <a:t>toti</a:t>
+            </a:r>
+            <a:r>
+              <a:rPr lang="en-US" dirty="0"/>
+              <a:t> </a:t>
+            </a:r>
+            <a:r>
+              <a:rPr lang="en-US" dirty="0" err="1"/>
+              <a:t>mutantii</a:t>
+            </a:r>
+            <a:r>
+              <a:rPr lang="en-US" dirty="0"/>
+              <a:t> au </a:t>
             </a:r>
             <a:r>
               <a:rPr lang="en-US" dirty="0" err="1"/>
@@ -6661,80 +7660,13 @@
             </a:r>
             <a:r>
               <a:rPr lang="en-US" dirty="0"/>
-              <a:t> testata, nu s-a </a:t>
-            </a:r>
-            <a:r>
-              <a:rPr lang="en-US" dirty="0" err="1"/>
-              <a:t>gasit</a:t>
-            </a:r>
-            <a:r>
-              <a:rPr lang="en-US" dirty="0"/>
               <a:t> </a:t>
             </a:r>
             <a:r>
               <a:rPr lang="en-US" dirty="0" err="1"/>
-              <a:t>niciun</a:t>
-            </a:r>
-            <a:r>
-              <a:rPr lang="en-US" dirty="0"/>
-              <a:t> mutant care </a:t>
-            </a:r>
-            <a:r>
-              <a:rPr lang="en-US" dirty="0" err="1"/>
-              <a:t>sa</a:t>
-            </a:r>
-            <a:r>
-              <a:rPr lang="en-US" dirty="0"/>
-              <a:t> </a:t>
-            </a:r>
-            <a:r>
-              <a:rPr lang="en-US" dirty="0" err="1"/>
-              <a:t>supravietuiasca</a:t>
-            </a:r>
-            <a:r>
-              <a:rPr lang="en-US" dirty="0"/>
-              <a:t> </a:t>
-            </a:r>
-            <a:r>
-              <a:rPr lang="en-US" dirty="0" err="1"/>
-              <a:t>testelor</a:t>
-            </a:r>
-            <a:r>
-              <a:rPr lang="en-US" dirty="0"/>
-              <a:t>, </a:t>
-            </a:r>
-            <a:r>
-              <a:rPr lang="en-US" dirty="0" err="1"/>
-              <a:t>fiind</a:t>
-            </a:r>
-            <a:r>
-              <a:rPr lang="en-US" dirty="0"/>
-              <a:t> </a:t>
-            </a:r>
-            <a:r>
-              <a:rPr lang="en-US" dirty="0" err="1"/>
-              <a:t>reflectat</a:t>
-            </a:r>
-            <a:r>
-              <a:rPr lang="en-US" dirty="0"/>
-              <a:t> de rata de </a:t>
-            </a:r>
-            <a:r>
-              <a:rPr lang="en-US" dirty="0" err="1"/>
-              <a:t>succes</a:t>
-            </a:r>
-            <a:r>
-              <a:rPr lang="en-US" dirty="0"/>
-              <a:t> a </a:t>
-            </a:r>
-            <a:r>
-              <a:rPr lang="en-US" dirty="0" err="1"/>
-              <a:t>testelor</a:t>
-            </a:r>
-            <a:r>
-              <a:rPr lang="en-US" dirty="0"/>
-              <a:t> de 100%:</a:t>
-            </a:r>
+              <a:t>omorati</a:t>
+            </a:r>
+            <a:endParaRPr lang="en-US" dirty="0"/>
           </a:p>
           <a:p>
             <a:endParaRPr lang="en-US" dirty="0"/>
@@ -6774,7 +7706,7 @@
         </p:blipFill>
         <p:spPr>
           <a:xfrm>
-            <a:off x="3010746" y="3349190"/>
+            <a:off x="2263218" y="3702275"/>
             <a:ext cx="6170508" cy="2899209"/>
           </a:xfrm>
           <a:prstGeom prst="rect">
@@ -7211,7 +8143,12 @@
             <p:ph type="title"/>
           </p:nvPr>
         </p:nvSpPr>
-        <p:spPr/>
+        <p:spPr>
+          <a:xfrm>
+            <a:off x="265865" y="100210"/>
+            <a:ext cx="9404723" cy="1400530"/>
+          </a:xfrm>
+        </p:spPr>
         <p:txBody>
           <a:bodyPr/>
           <a:lstStyle/>
@@ -7251,7 +8188,7 @@
         </p:blipFill>
         <p:spPr>
           <a:xfrm>
-            <a:off x="8526513" y="259459"/>
+            <a:off x="9368485" y="78390"/>
             <a:ext cx="2289010" cy="5942281"/>
           </a:xfrm>
           <a:prstGeom prst="rect">
@@ -7287,8 +8224,38 @@
         </p:blipFill>
         <p:spPr>
           <a:xfrm>
-            <a:off x="525126" y="1741201"/>
+            <a:off x="353110" y="1198730"/>
             <a:ext cx="7083848" cy="4460539"/>
+          </a:xfrm>
+          <a:prstGeom prst="rect">
+            <a:avLst/>
+          </a:prstGeom>
+        </p:spPr>
+      </p:pic>
+      <p:pic>
+        <p:nvPicPr>
+          <p:cNvPr id="10" name="Picture 9">
+            <a:extLst>
+              <a:ext uri="{FF2B5EF4-FFF2-40B4-BE49-F238E27FC236}">
+                <a16:creationId xmlns:a16="http://schemas.microsoft.com/office/drawing/2014/main" id="{5C5A50A5-506F-F618-2E65-173D7FA1A22F}"/>
+              </a:ext>
+            </a:extLst>
+          </p:cNvPr>
+          <p:cNvPicPr>
+            <a:picLocks noChangeAspect="1"/>
+          </p:cNvPicPr>
+          <p:nvPr/>
+        </p:nvPicPr>
+        <p:blipFill>
+          <a:blip r:embed="rId4"/>
+          <a:stretch>
+            <a:fillRect/>
+          </a:stretch>
+        </p:blipFill>
+        <p:spPr>
+          <a:xfrm>
+            <a:off x="353110" y="6020671"/>
+            <a:ext cx="7468642" cy="323895"/>
           </a:xfrm>
           <a:prstGeom prst="rect">
             <a:avLst/>
@@ -7691,7 +8658,7 @@
         </p:spPr>
         <p:txBody>
           <a:bodyPr>
-            <a:normAutofit fontScale="92500" lnSpcReduction="10000"/>
+            <a:normAutofit fontScale="92500" lnSpcReduction="20000"/>
           </a:bodyPr>
           <a:lstStyle/>
           <a:p>
@@ -7704,21 +8671,45 @@
             <a:pPr lvl="1"/>
             <a:r>
               <a:rPr lang="en-US" dirty="0"/>
-              <a:t>{ salary ∈ N | salary &lt;= 3000 }</a:t>
+              <a:t>S1 = { salary ∈ N | salary &lt;= 3000 };                    </a:t>
+            </a:r>
+            <a:r>
+              <a:rPr lang="en-US" dirty="0" err="1"/>
+              <a:t>alegem</a:t>
+            </a:r>
+            <a:r>
+              <a:rPr lang="en-US" dirty="0"/>
+              <a:t> s1 = 2500</a:t>
             </a:r>
           </a:p>
           <a:p>
             <a:pPr lvl="1"/>
             <a:r>
               <a:rPr lang="en-US" dirty="0"/>
-              <a:t>{ salary ∈ N | 3000 &lt; salary &lt;= 6000 }</a:t>
+              <a:t>S2 = { salary ∈ N | 3000 &lt; salary &lt;= 6000 };        </a:t>
+            </a:r>
+            <a:r>
+              <a:rPr lang="en-US" dirty="0" err="1"/>
+              <a:t>alegem</a:t>
+            </a:r>
+            <a:r>
+              <a:rPr lang="en-US" dirty="0"/>
+              <a:t> s2 = 4500</a:t>
             </a:r>
           </a:p>
           <a:p>
             <a:pPr lvl="1"/>
             <a:r>
               <a:rPr lang="en-US" dirty="0"/>
-              <a:t>{ salary ∈ N | 6000 &lt; salary }</a:t>
+              <a:t>S3 = { salary ∈ N | salary &gt; 6000 }; 		 	 </a:t>
+            </a:r>
+            <a:r>
+              <a:rPr lang="en-US" dirty="0" err="1"/>
+              <a:t>alegem</a:t>
+            </a:r>
+            <a:r>
+              <a:rPr lang="en-US" dirty="0"/>
+              <a:t> s3 = 8000</a:t>
             </a:r>
           </a:p>
           <a:p>
@@ -7731,20 +8722,36 @@
             <a:pPr lvl="1"/>
             <a:r>
               <a:rPr lang="en-US" dirty="0"/>
-              <a:t>{ dividend ∈ N | dividend &lt; 10000 }</a:t>
+              <a:t>D1 = { dividend ∈ N | dividend &lt; 10000 };          </a:t>
+            </a:r>
+            <a:r>
+              <a:rPr lang="en-US" dirty="0" err="1"/>
+              <a:t>alegem</a:t>
+            </a:r>
+            <a:r>
+              <a:rPr lang="en-US" dirty="0"/>
+              <a:t> d1 = 1000</a:t>
             </a:r>
           </a:p>
           <a:p>
             <a:pPr lvl="1"/>
             <a:r>
               <a:rPr lang="en-US" dirty="0"/>
-              <a:t>{ dividend ∈ N | dividend &gt;= 10000 }</a:t>
-            </a:r>
-          </a:p>
-          <a:p>
-            <a:r>
-              <a:rPr lang="en-US" dirty="0"/>
-              <a:t>Rental Income ( { </a:t>
+              <a:t>D2 = { dividend ∈ N | dividend &gt;= 10000 };        </a:t>
+            </a:r>
+            <a:r>
+              <a:rPr lang="en-US" dirty="0" err="1"/>
+              <a:t>alegem</a:t>
+            </a:r>
+            <a:r>
+              <a:rPr lang="en-US" dirty="0"/>
+              <a:t> d2 = 12000</a:t>
+            </a:r>
+          </a:p>
+          <a:p>
+            <a:r>
+              <a:rPr lang="en-US" dirty="0"/>
+              <a:t>Rental Income : Ri = { </a:t>
             </a:r>
             <a:r>
               <a:rPr lang="en-US" dirty="0" err="1"/>
@@ -7752,19 +8759,43 @@
             </a:r>
             <a:r>
               <a:rPr lang="en-US" dirty="0"/>
-              <a:t> ∈ N } )</a:t>
-            </a:r>
-          </a:p>
-          <a:p>
-            <a:r>
-              <a:rPr lang="en-US" dirty="0"/>
-              <a:t>Diploma (True, False)</a:t>
-            </a:r>
-          </a:p>
-          <a:p>
-            <a:r>
-              <a:rPr lang="en-US" dirty="0"/>
-              <a:t>Food Ticket (True, False)</a:t>
+              <a:t> ∈ N };     </a:t>
+            </a:r>
+            <a:r>
+              <a:rPr lang="en-US" dirty="0" err="1"/>
+              <a:t>alegem</a:t>
+            </a:r>
+            <a:r>
+              <a:rPr lang="en-US" dirty="0"/>
+              <a:t> r = 500</a:t>
+            </a:r>
+          </a:p>
+          <a:p>
+            <a:r>
+              <a:rPr lang="en-US" dirty="0"/>
+              <a:t>Diploma (True, False);						 </a:t>
+            </a:r>
+            <a:r>
+              <a:rPr lang="en-US" dirty="0" err="1"/>
+              <a:t>alegem</a:t>
+            </a:r>
+            <a:r>
+              <a:rPr lang="en-US" dirty="0"/>
+              <a:t> di1 = True, di2 = False</a:t>
+            </a:r>
+          </a:p>
+          <a:p>
+            <a:r>
+              <a:rPr lang="en-US" dirty="0"/>
+              <a:t>Food Ticket (True, False);                                    </a:t>
+            </a:r>
+            <a:r>
+              <a:rPr lang="en-US" dirty="0" err="1"/>
+              <a:t>alegem</a:t>
+            </a:r>
+            <a:r>
+              <a:rPr lang="en-US" dirty="0"/>
+              <a:t> f1 = True, f2 = False</a:t>
             </a:r>
           </a:p>
           <a:p>
@@ -7805,7 +8836,60 @@
             </a:r>
             <a:r>
               <a:rPr lang="en-US" dirty="0"/>
-              <a:t> (3 x 2 x 1 x 2 x 2)</a:t>
+              <a:t> (3 x 2 x 1 x 2 x 2).</a:t>
+            </a:r>
+          </a:p>
+          <a:p>
+            <a:pPr marL="0" indent="0">
+              <a:buNone/>
+            </a:pPr>
+            <a:r>
+              <a:rPr lang="en-US" dirty="0" err="1"/>
+              <a:t>Acesta</a:t>
+            </a:r>
+            <a:r>
+              <a:rPr lang="en-US" dirty="0"/>
+              <a:t> </a:t>
+            </a:r>
+            <a:r>
+              <a:rPr lang="en-US" dirty="0" err="1"/>
+              <a:t>este</a:t>
+            </a:r>
+            <a:r>
+              <a:rPr lang="en-US" dirty="0"/>
+              <a:t> </a:t>
+            </a:r>
+            <a:r>
+              <a:rPr lang="en-US" dirty="0" err="1"/>
+              <a:t>si</a:t>
+            </a:r>
+            <a:r>
+              <a:rPr lang="en-US" dirty="0"/>
+              <a:t> </a:t>
+            </a:r>
+            <a:r>
+              <a:rPr lang="en-US" dirty="0" err="1"/>
+              <a:t>numarul</a:t>
+            </a:r>
+            <a:r>
+              <a:rPr lang="en-US" dirty="0"/>
+              <a:t> de path-</a:t>
+            </a:r>
+            <a:r>
+              <a:rPr lang="en-US" dirty="0" err="1"/>
+              <a:t>uri</a:t>
+            </a:r>
+            <a:r>
+              <a:rPr lang="en-US" dirty="0"/>
+              <a:t> ale </a:t>
+            </a:r>
+            <a:r>
+              <a:rPr lang="en-US" dirty="0" err="1"/>
+              <a:t>programului</a:t>
+            </a:r>
+            <a:r>
+              <a:rPr lang="en-US" dirty="0"/>
+              <a:t>.</a:t>
             </a:r>
             <a:endParaRPr lang="LID4096" dirty="0"/>
           </a:p>
@@ -7981,40 +9065,160 @@
           </a:xfrm>
         </p:spPr>
         <p:txBody>
-          <a:bodyPr/>
+          <a:bodyPr>
+            <a:normAutofit/>
+          </a:bodyPr>
           <a:lstStyle/>
           <a:p>
+            <a:r>
+              <a:rPr lang="en-US" dirty="0" err="1"/>
+              <a:t>Salariu</a:t>
+            </a:r>
+            <a:r>
+              <a:rPr lang="en-US" dirty="0"/>
+              <a:t> (0 – 3000; 3001 – 6000; 6001+) =&gt; 5 </a:t>
+            </a:r>
+            <a:r>
+              <a:rPr lang="en-US" dirty="0" err="1"/>
+              <a:t>valori</a:t>
+            </a:r>
+            <a:endParaRPr lang="en-US" dirty="0"/>
+          </a:p>
+          <a:p>
+            <a:pPr lvl="1"/>
+            <a:r>
+              <a:rPr lang="en-US" dirty="0"/>
+              <a:t>S1: {0, 3000}, </a:t>
+            </a:r>
+          </a:p>
+          <a:p>
+            <a:pPr lvl="1"/>
+            <a:r>
+              <a:rPr lang="en-US" dirty="0"/>
+              <a:t>S2: {3001, 6000},</a:t>
+            </a:r>
+          </a:p>
+          <a:p>
+            <a:pPr lvl="1"/>
+            <a:r>
+              <a:rPr lang="en-US" dirty="0"/>
+              <a:t>S3: {6001} </a:t>
+            </a:r>
+          </a:p>
+          <a:p>
+            <a:r>
+              <a:rPr lang="en-US" dirty="0" err="1"/>
+              <a:t>Dividende</a:t>
+            </a:r>
+            <a:r>
+              <a:rPr lang="en-US" dirty="0"/>
+              <a:t> (0 – 10000; 10001+) =&gt; 3 </a:t>
+            </a:r>
+            <a:r>
+              <a:rPr lang="en-US" dirty="0" err="1"/>
+              <a:t>valori</a:t>
+            </a:r>
+            <a:endParaRPr lang="en-US" dirty="0"/>
+          </a:p>
+          <a:p>
+            <a:pPr lvl="1"/>
+            <a:r>
+              <a:rPr lang="en-US" dirty="0"/>
+              <a:t>D1: {0, 10000},  </a:t>
+            </a:r>
+          </a:p>
+          <a:p>
+            <a:pPr lvl="1"/>
+            <a:r>
+              <a:rPr lang="en-US" dirty="0"/>
+              <a:t>D2: {10001}</a:t>
+            </a:r>
+          </a:p>
+          <a:p>
             <a:pPr marL="0" indent="0">
               <a:buNone/>
             </a:pPr>
-            <a:r>
-              <a:rPr lang="en-US"/>
-              <a:t>Similar, valorile de frontiera sunt testate exhaustiv pentru toate posibilitatile, se taxeaza diferit pentru:</a:t>
-            </a:r>
-          </a:p>
-          <a:p>
-            <a:r>
-              <a:rPr lang="en-US"/>
-              <a:t>Salariu (low, 0 – 3000; medium, 3001 – 6000; high, 6001+)</a:t>
-            </a:r>
-          </a:p>
-          <a:p>
-            <a:r>
-              <a:rPr lang="en-US"/>
-              <a:t>Dividende (low, 0 – 10000; high, 10001+)</a:t>
-            </a:r>
+            <a:endParaRPr lang="en-US" dirty="0"/>
           </a:p>
           <a:p>
             <a:pPr marL="0" indent="0">
               <a:buNone/>
             </a:pPr>
             <a:r>
-              <a:rPr lang="en-US"/>
-              <a:t>In fiecare caz se testeaza valorile cele mai mici si cele mai mari din clasele de echivalenta pentru aceste intervale, iar in total au fost generate 15 teste pentru valorile de frontiera (5 x 3)</a:t>
-            </a:r>
-          </a:p>
-          <a:p>
-            <a:endParaRPr lang="en-US"/>
+              <a:rPr lang="en-US" dirty="0" err="1"/>
+              <a:t>Selectam</a:t>
+            </a:r>
+            <a:r>
+              <a:rPr lang="en-US" dirty="0"/>
+              <a:t> </a:t>
+            </a:r>
+            <a:r>
+              <a:rPr lang="en-US" dirty="0" err="1"/>
+              <a:t>valorile</a:t>
+            </a:r>
+            <a:r>
+              <a:rPr lang="en-US" dirty="0"/>
+              <a:t> </a:t>
+            </a:r>
+            <a:r>
+              <a:rPr lang="en-US" dirty="0" err="1"/>
+              <a:t>minime</a:t>
+            </a:r>
+            <a:r>
+              <a:rPr lang="en-US" dirty="0"/>
+              <a:t> </a:t>
+            </a:r>
+            <a:r>
+              <a:rPr lang="en-US" dirty="0" err="1"/>
+              <a:t>si</a:t>
+            </a:r>
+            <a:r>
+              <a:rPr lang="en-US" dirty="0"/>
+              <a:t> </a:t>
+            </a:r>
+            <a:r>
+              <a:rPr lang="en-US" dirty="0" err="1"/>
+              <a:t>maxime</a:t>
+            </a:r>
+            <a:r>
+              <a:rPr lang="en-US" dirty="0"/>
+              <a:t> </a:t>
+            </a:r>
+            <a:r>
+              <a:rPr lang="en-US" dirty="0" err="1"/>
+              <a:t>pentru</a:t>
+            </a:r>
+            <a:r>
+              <a:rPr lang="en-US" dirty="0"/>
+              <a:t> </a:t>
+            </a:r>
+            <a:r>
+              <a:rPr lang="en-US" dirty="0" err="1"/>
+              <a:t>fiecare</a:t>
+            </a:r>
+            <a:r>
+              <a:rPr lang="en-US" dirty="0"/>
+              <a:t> </a:t>
+            </a:r>
+            <a:r>
+              <a:rPr lang="en-US" dirty="0" err="1"/>
+              <a:t>clasa</a:t>
+            </a:r>
+            <a:r>
+              <a:rPr lang="en-US" dirty="0"/>
+              <a:t> de </a:t>
+            </a:r>
+            <a:r>
+              <a:rPr lang="en-US" dirty="0" err="1"/>
+              <a:t>echivalenta</a:t>
+            </a:r>
+            <a:r>
+              <a:rPr lang="en-US" dirty="0"/>
+              <a:t>. In total, sunt generate 15 teste (5 x 3)</a:t>
+            </a:r>
+          </a:p>
+          <a:p>
+            <a:endParaRPr lang="en-US" dirty="0"/>
           </a:p>
         </p:txBody>
       </p:sp>

</xml_diff>